<commit_message>
bổ sung bai làm
</commit_message>
<xml_diff>
--- a/0812611/Agile_How_P2.pptx
+++ b/0812611/Agile_How_P2.pptx
@@ -516,11 +516,7 @@
             </a:r>
             <a:r>
               <a:rPr lang="en-US" baseline="0" dirty="0" smtClean="0"/>
-              <a:t> pháp này, các thành viên làm việc chung trên mã nguồn. Bất kì thành viên nào cũng có thể làm việc trên bất kì 1 phần nào của mã nguồn bất cứ lúc nào</a:t>
-            </a:r>
-            <a:r>
-              <a:rPr lang="en-US" baseline="0" dirty="0" smtClean="0"/>
-              <a:t>.</a:t>
+              <a:t> pháp này, các thành viên làm việc chung trên mã nguồn. Bất kì thành viên nào cũng có thể làm việc trên bất kì 1 phần nào của mã nguồn bất cứ lúc nào.</a:t>
             </a:r>
           </a:p>
           <a:p>
@@ -714,11 +710,7 @@
             </a:r>
             <a:r>
               <a:rPr lang="en-US" baseline="0" dirty="0" smtClean="0"/>
-              <a:t> vơi các dự án và đội ngũ phát triển nhỏ, tích hợp là chuyện đơn giản. Nhưng đối với các dự án lớn thì việc này khó khăn hơn nhiều, do đó nên sử dụng các hệ thống tích hợp tự động</a:t>
-            </a:r>
-            <a:r>
-              <a:rPr lang="en-US" baseline="0" dirty="0" smtClean="0"/>
-              <a:t>.</a:t>
+              <a:t> vơi các dự án và đội ngũ phát triển nhỏ, tích hợp là chuyện đơn giản. Nhưng đối với các dự án lớn thì việc này khó khăn hơn nhiều, do đó nên sử dụng các hệ thống tích hợp tự động.</a:t>
             </a:r>
           </a:p>
           <a:p>
@@ -818,11 +810,7 @@
             </a:pPr>
             <a:r>
               <a:rPr lang="en-US" baseline="0" dirty="0" smtClean="0"/>
-              <a:t> Những khách hàng </a:t>
-            </a:r>
-            <a:r>
-              <a:rPr lang="en-US" baseline="0" dirty="0" smtClean="0"/>
-              <a:t>“tại chỗ”</a:t>
+              <a:t> Những khách hàng “tại chỗ”</a:t>
             </a:r>
             <a:r>
               <a:rPr lang="vi-VN" dirty="0" smtClean="0"/>
@@ -842,11 +830,7 @@
             </a:r>
             <a:r>
               <a:rPr lang="en-US" baseline="0" dirty="0" smtClean="0"/>
-              <a:t> </a:t>
-            </a:r>
-            <a:r>
-              <a:rPr lang="en-US" baseline="0" dirty="0" smtClean="0"/>
-              <a:t>buộc</a:t>
+              <a:t> buộc</a:t>
             </a:r>
             <a:r>
               <a:rPr lang="en-US" dirty="0" smtClean="0"/>
@@ -4661,215 +4645,180 @@
                   <a:schemeClr val="tx1"/>
                 </a:solidFill>
               </a:rPr>
-              <a:t>7. Sở hữu chung mã nguồn</a:t>
-            </a:r>
-          </a:p>
-          <a:p>
-            <a:pPr algn="l"/>
-            <a:r>
-              <a:rPr lang="en-US" dirty="0">
-                <a:solidFill>
-                  <a:schemeClr val="tx1">
-                    <a:lumMod val="75000"/>
-                    <a:lumOff val="25000"/>
-                  </a:schemeClr>
-                </a:solidFill>
-              </a:rPr>
-              <a:t> </a:t>
-            </a:r>
-            <a:r>
-              <a:rPr lang="en-US" dirty="0" smtClean="0">
-                <a:solidFill>
-                  <a:schemeClr val="tx1">
-                    <a:lumMod val="75000"/>
-                    <a:lumOff val="25000"/>
-                  </a:schemeClr>
-                </a:solidFill>
-              </a:rPr>
-              <a:t>   </a:t>
-            </a:r>
-            <a:r>
-              <a:rPr lang="en-US" sz="2600" dirty="0" smtClean="0">
-                <a:solidFill>
-                  <a:schemeClr val="tx1">
-                    <a:lumMod val="75000"/>
-                    <a:lumOff val="25000"/>
-                  </a:schemeClr>
-                </a:solidFill>
-              </a:rPr>
-              <a:t>- Mã nguồn thuộc về dự án, không phải của riêng cá nhân nào.</a:t>
-            </a:r>
-          </a:p>
-          <a:p>
-            <a:pPr algn="l"/>
-            <a:r>
-              <a:rPr lang="en-US" sz="2600" dirty="0">
-                <a:solidFill>
-                  <a:schemeClr val="tx1">
-                    <a:lumMod val="75000"/>
-                    <a:lumOff val="25000"/>
-                  </a:schemeClr>
-                </a:solidFill>
-              </a:rPr>
-              <a:t> </a:t>
-            </a:r>
-            <a:r>
-              <a:rPr lang="en-US" sz="2600" dirty="0" smtClean="0">
-                <a:solidFill>
-                  <a:schemeClr val="tx1">
-                    <a:lumMod val="75000"/>
-                    <a:lumOff val="25000"/>
-                  </a:schemeClr>
-                </a:solidFill>
-              </a:rPr>
-              <a:t>   - Lập trình viên nào cũng có thể chỉnh sửa bất kì đoạn mã nào.</a:t>
-            </a:r>
-          </a:p>
-          <a:p>
-            <a:pPr algn="l"/>
-            <a:r>
-              <a:rPr lang="en-US" sz="2600" dirty="0">
-                <a:solidFill>
-                  <a:schemeClr val="tx1">
-                    <a:lumMod val="75000"/>
-                    <a:lumOff val="25000"/>
-                  </a:schemeClr>
-                </a:solidFill>
-              </a:rPr>
-              <a:t> </a:t>
-            </a:r>
-            <a:r>
-              <a:rPr lang="en-US" sz="2600" dirty="0" smtClean="0">
-                <a:solidFill>
-                  <a:schemeClr val="tx1">
-                    <a:lumMod val="75000"/>
-                    <a:lumOff val="25000"/>
-                  </a:schemeClr>
-                </a:solidFill>
-              </a:rPr>
-              <a:t>   - Chất lượng của mã nguồn sẽ cao hơn.</a:t>
-            </a:r>
-          </a:p>
-          <a:p>
-            <a:pPr algn="l"/>
-            <a:r>
-              <a:rPr lang="en-US" sz="2600" dirty="0">
-                <a:solidFill>
-                  <a:schemeClr val="tx1">
-                    <a:lumMod val="75000"/>
-                    <a:lumOff val="25000"/>
-                  </a:schemeClr>
-                </a:solidFill>
-              </a:rPr>
-              <a:t> </a:t>
-            </a:r>
-            <a:r>
-              <a:rPr lang="en-US" sz="2600" dirty="0" smtClean="0">
-                <a:solidFill>
-                  <a:schemeClr val="tx1">
-                    <a:lumMod val="75000"/>
-                    <a:lumOff val="25000"/>
-                  </a:schemeClr>
-                </a:solidFill>
-              </a:rPr>
-              <a:t>   - Lập trình viên không </a:t>
-            </a:r>
-            <a:r>
-              <a:rPr lang="en-US" sz="2600" dirty="0" smtClean="0">
-                <a:solidFill>
-                  <a:schemeClr val="tx1">
-                    <a:lumMod val="75000"/>
-                    <a:lumOff val="25000"/>
-                  </a:schemeClr>
-                </a:solidFill>
-              </a:rPr>
-              <a:t>phải</a:t>
-            </a:r>
-            <a:r>
-              <a:rPr lang="en-US" sz="2600" dirty="0" smtClean="0">
-                <a:solidFill>
-                  <a:schemeClr val="tx1">
-                    <a:lumMod val="75000"/>
-                    <a:lumOff val="25000"/>
-                  </a:schemeClr>
-                </a:solidFill>
-              </a:rPr>
-              <a:t> </a:t>
-            </a:r>
-            <a:r>
-              <a:rPr lang="en-US" sz="2600" dirty="0" smtClean="0">
-                <a:solidFill>
-                  <a:schemeClr val="tx1">
-                    <a:lumMod val="75000"/>
-                    <a:lumOff val="25000"/>
-                  </a:schemeClr>
-                </a:solidFill>
-              </a:rPr>
-              <a:t>làm việc với các </a:t>
-            </a:r>
-            <a:r>
-              <a:rPr lang="en-US" sz="2600" dirty="0" smtClean="0">
-                <a:solidFill>
-                  <a:schemeClr val="tx1">
-                    <a:lumMod val="75000"/>
-                    <a:lumOff val="25000"/>
-                  </a:schemeClr>
-                </a:solidFill>
-              </a:rPr>
-              <a:t>lỗi</a:t>
-            </a:r>
-            <a:r>
-              <a:rPr lang="en-US" sz="2600" dirty="0" smtClean="0">
-                <a:solidFill>
-                  <a:schemeClr val="tx1">
-                    <a:lumMod val="75000"/>
-                    <a:lumOff val="25000"/>
-                  </a:schemeClr>
-                </a:solidFill>
-              </a:rPr>
-              <a:t> của người khác.</a:t>
-            </a:r>
-          </a:p>
-          <a:p>
-            <a:pPr algn="l"/>
-            <a:r>
-              <a:rPr lang="en-US" sz="2800" dirty="0" smtClean="0">
-                <a:solidFill>
-                  <a:schemeClr val="tx1">
-                    <a:lumMod val="75000"/>
-                    <a:lumOff val="25000"/>
-                  </a:schemeClr>
-                </a:solidFill>
-              </a:rPr>
-              <a:t> </a:t>
-            </a:r>
-            <a:r>
-              <a:rPr lang="en-US" sz="2600" dirty="0" smtClean="0">
-                <a:solidFill>
-                  <a:schemeClr val="tx1">
-                    <a:lumMod val="75000"/>
-                    <a:lumOff val="25000"/>
-                  </a:schemeClr>
-                </a:solidFill>
-              </a:rPr>
-              <a:t>- Sở hữu chung mã nguồn là bắt buộc.</a:t>
-            </a:r>
-            <a:endParaRPr lang="en-US" sz="2600" dirty="0" smtClean="0">
+              <a:t>7. </a:t>
+            </a:r>
+            <a:r>
+              <a:rPr lang="en-US" sz="3600" b="1" smtClean="0">
+                <a:solidFill>
+                  <a:schemeClr val="tx1"/>
+                </a:solidFill>
+              </a:rPr>
+              <a:t>Collective Code </a:t>
+            </a:r>
+            <a:r>
+              <a:rPr lang="en-US" sz="3600" b="1" dirty="0" smtClean="0">
+                <a:solidFill>
+                  <a:schemeClr val="tx1"/>
+                </a:solidFill>
+              </a:rPr>
+              <a:t>O</a:t>
+            </a:r>
+            <a:r>
+              <a:rPr lang="en-US" sz="3600" b="1" smtClean="0">
+                <a:solidFill>
+                  <a:schemeClr val="tx1"/>
+                </a:solidFill>
+              </a:rPr>
+              <a:t>wnership</a:t>
+            </a:r>
+            <a:endParaRPr lang="en-US" sz="3600" b="1" dirty="0" smtClean="0">
               <a:solidFill>
-                <a:schemeClr val="tx1">
-                  <a:lumMod val="75000"/>
-                  <a:lumOff val="25000"/>
-                </a:schemeClr>
+                <a:schemeClr val="tx1"/>
               </a:solidFill>
             </a:endParaRPr>
           </a:p>
           <a:p>
             <a:pPr algn="l"/>
             <a:r>
+              <a:rPr lang="en-US" dirty="0">
+                <a:solidFill>
+                  <a:schemeClr val="tx1">
+                    <a:lumMod val="75000"/>
+                    <a:lumOff val="25000"/>
+                  </a:schemeClr>
+                </a:solidFill>
+              </a:rPr>
+              <a:t> </a:t>
+            </a:r>
+            <a:r>
+              <a:rPr lang="en-US" dirty="0" smtClean="0">
+                <a:solidFill>
+                  <a:schemeClr val="tx1">
+                    <a:lumMod val="75000"/>
+                    <a:lumOff val="25000"/>
+                  </a:schemeClr>
+                </a:solidFill>
+              </a:rPr>
+              <a:t>   </a:t>
+            </a:r>
+            <a:r>
+              <a:rPr lang="en-US" sz="2600" dirty="0" smtClean="0">
+                <a:solidFill>
+                  <a:schemeClr val="tx1">
+                    <a:lumMod val="75000"/>
+                    <a:lumOff val="25000"/>
+                  </a:schemeClr>
+                </a:solidFill>
+              </a:rPr>
+              <a:t>- Mã nguồn thuộc về dự án, không phải của riêng cá nhân nào.</a:t>
+            </a:r>
+          </a:p>
+          <a:p>
+            <a:pPr algn="l"/>
+            <a:r>
+              <a:rPr lang="en-US" sz="2600" dirty="0">
+                <a:solidFill>
+                  <a:schemeClr val="tx1">
+                    <a:lumMod val="75000"/>
+                    <a:lumOff val="25000"/>
+                  </a:schemeClr>
+                </a:solidFill>
+              </a:rPr>
+              <a:t> </a:t>
+            </a:r>
+            <a:r>
+              <a:rPr lang="en-US" sz="2600" dirty="0" smtClean="0">
+                <a:solidFill>
+                  <a:schemeClr val="tx1">
+                    <a:lumMod val="75000"/>
+                    <a:lumOff val="25000"/>
+                  </a:schemeClr>
+                </a:solidFill>
+              </a:rPr>
+              <a:t>   - Lập trình viên nào cũng có thể chỉnh sửa bất kì đoạn mã nào.</a:t>
+            </a:r>
+          </a:p>
+          <a:p>
+            <a:pPr algn="l"/>
+            <a:r>
+              <a:rPr lang="en-US" sz="2600" dirty="0">
+                <a:solidFill>
+                  <a:schemeClr val="tx1">
+                    <a:lumMod val="75000"/>
+                    <a:lumOff val="25000"/>
+                  </a:schemeClr>
+                </a:solidFill>
+              </a:rPr>
+              <a:t> </a:t>
+            </a:r>
+            <a:r>
+              <a:rPr lang="en-US" sz="2600" dirty="0" smtClean="0">
+                <a:solidFill>
+                  <a:schemeClr val="tx1">
+                    <a:lumMod val="75000"/>
+                    <a:lumOff val="25000"/>
+                  </a:schemeClr>
+                </a:solidFill>
+              </a:rPr>
+              <a:t>   - Chất lượng của mã nguồn sẽ cao hơn.</a:t>
+            </a:r>
+          </a:p>
+          <a:p>
+            <a:pPr algn="l"/>
+            <a:r>
+              <a:rPr lang="en-US" sz="2600" dirty="0">
+                <a:solidFill>
+                  <a:schemeClr val="tx1">
+                    <a:lumMod val="75000"/>
+                    <a:lumOff val="25000"/>
+                  </a:schemeClr>
+                </a:solidFill>
+              </a:rPr>
+              <a:t> </a:t>
+            </a:r>
+            <a:r>
+              <a:rPr lang="en-US" sz="2600" dirty="0" smtClean="0">
+                <a:solidFill>
+                  <a:schemeClr val="tx1">
+                    <a:lumMod val="75000"/>
+                    <a:lumOff val="25000"/>
+                  </a:schemeClr>
+                </a:solidFill>
+              </a:rPr>
+              <a:t>   - Lập trình viên không phải làm việc với các lỗi của người khác.</a:t>
+            </a:r>
+          </a:p>
+          <a:p>
+            <a:pPr algn="l"/>
+            <a:r>
+              <a:rPr lang="en-US" sz="2800" dirty="0" smtClean="0">
+                <a:solidFill>
+                  <a:schemeClr val="tx1">
+                    <a:lumMod val="75000"/>
+                    <a:lumOff val="25000"/>
+                  </a:schemeClr>
+                </a:solidFill>
+              </a:rPr>
+              <a:t> </a:t>
+            </a:r>
+            <a:r>
+              <a:rPr lang="en-US" sz="2600" dirty="0" smtClean="0">
+                <a:solidFill>
+                  <a:schemeClr val="tx1">
+                    <a:lumMod val="75000"/>
+                    <a:lumOff val="25000"/>
+                  </a:schemeClr>
+                </a:solidFill>
+              </a:rPr>
+              <a:t>- Sở hữu chung mã nguồn là bắt buộc.</a:t>
+            </a:r>
+          </a:p>
+          <a:p>
+            <a:pPr algn="l"/>
+            <a:r>
               <a:rPr lang="en-US" sz="2600" dirty="0" smtClean="0"/>
               <a:t>       </a:t>
             </a:r>
-            <a:endParaRPr lang="en-US" sz="2600" dirty="0" smtClean="0"/>
           </a:p>
         </p:txBody>
       </p:sp>
@@ -4965,8 +4914,21 @@
                   <a:schemeClr val="tx1"/>
                 </a:solidFill>
               </a:rPr>
-              <a:t>. Tích hợp liên tục</a:t>
-            </a:r>
+              <a:t>. </a:t>
+            </a:r>
+            <a:r>
+              <a:rPr lang="en-US" sz="3600" b="1" dirty="0" smtClean="0">
+                <a:solidFill>
+                  <a:schemeClr val="tx1"/>
+                </a:solidFill>
+              </a:rPr>
+              <a:t>Continuous  Integration</a:t>
+            </a:r>
+            <a:endParaRPr lang="en-US" sz="3600" b="1" dirty="0" smtClean="0">
+              <a:solidFill>
+                <a:schemeClr val="tx1"/>
+              </a:solidFill>
+            </a:endParaRPr>
           </a:p>
           <a:p>
             <a:pPr algn="l"/>
@@ -5165,7 +5127,7 @@
                   <a:schemeClr val="tx1"/>
                 </a:solidFill>
               </a:rPr>
-              <a:t>9. Khách hàng </a:t>
+              <a:t>9. </a:t>
             </a:r>
             <a:r>
               <a:rPr lang="en-US" sz="3600" b="1" dirty="0" smtClean="0">
@@ -5173,7 +5135,7 @@
                   <a:schemeClr val="tx1"/>
                 </a:solidFill>
               </a:rPr>
-              <a:t>“tại chỗ”</a:t>
+              <a:t>On-site  Customer</a:t>
             </a:r>
             <a:endParaRPr lang="en-US" sz="3600" b="1" dirty="0" smtClean="0">
               <a:solidFill>
@@ -5214,7 +5176,21 @@
                   </a:schemeClr>
                 </a:solidFill>
               </a:rPr>
-              <a:t>- </a:t>
+              <a:t>- Tiếp xúc khách hàng thường xuyên.</a:t>
+            </a:r>
+          </a:p>
+          <a:p>
+            <a:pPr algn="l"/>
+            <a:r>
+              <a:rPr lang="en-US" sz="2600" dirty="0">
+                <a:solidFill>
+                  <a:schemeClr val="tx1">
+                    <a:lumMod val="75000"/>
+                    <a:lumOff val="25000"/>
+                  </a:schemeClr>
+                </a:solidFill>
+              </a:rPr>
+              <a:t> </a:t>
             </a:r>
             <a:r>
               <a:rPr lang="en-US" sz="2600" dirty="0" smtClean="0">
@@ -5225,16 +5201,8 @@
                   </a:schemeClr>
                 </a:solidFill>
               </a:rPr>
-              <a:t>Tiếp xúc khách hàng thường xuyên.</a:t>
-            </a:r>
-            <a:endParaRPr lang="en-US" sz="2600" dirty="0" smtClean="0">
-              <a:solidFill>
-                <a:schemeClr val="tx1">
-                  <a:lumMod val="75000"/>
-                  <a:lumOff val="25000"/>
-                </a:schemeClr>
-              </a:solidFill>
-            </a:endParaRPr>
+              <a:t>    - Lập trình viên không cần phải đưa ra các giả định.</a:t>
+            </a:r>
           </a:p>
           <a:p>
             <a:pPr algn="l"/>
@@ -5258,7 +5226,21 @@
                   </a:schemeClr>
                 </a:solidFill>
               </a:rPr>
-              <a:t>    - </a:t>
+              <a:t>    - Gặp mặt trực tiếp khách hàng sẽ giảm thiểu các hiểu lầm.</a:t>
+            </a:r>
+          </a:p>
+          <a:p>
+            <a:pPr algn="l"/>
+            <a:r>
+              <a:rPr lang="en-US" sz="2600" dirty="0">
+                <a:solidFill>
+                  <a:schemeClr val="tx1">
+                    <a:lumMod val="75000"/>
+                    <a:lumOff val="25000"/>
+                  </a:schemeClr>
+                </a:solidFill>
+              </a:rPr>
+              <a:t> </a:t>
             </a:r>
             <a:r>
               <a:rPr lang="en-US" sz="2600" dirty="0" smtClean="0">
@@ -5269,31 +5251,12 @@
                   </a:schemeClr>
                 </a:solidFill>
               </a:rPr>
-              <a:t>Lập trình viên không cần phải đưa ra các giả định.</a:t>
-            </a:r>
-            <a:endParaRPr lang="en-US" sz="2600" dirty="0" smtClean="0">
-              <a:solidFill>
-                <a:schemeClr val="tx1">
-                  <a:lumMod val="75000"/>
-                  <a:lumOff val="25000"/>
-                </a:schemeClr>
-              </a:solidFill>
-            </a:endParaRPr>
+              <a:t>    - Khách hàng quá bận: gặp hằng ngày</a:t>
+            </a:r>
           </a:p>
           <a:p>
             <a:pPr algn="l"/>
             <a:r>
-              <a:rPr lang="en-US" sz="2600" dirty="0">
-                <a:solidFill>
-                  <a:schemeClr val="tx1">
-                    <a:lumMod val="75000"/>
-                    <a:lumOff val="25000"/>
-                  </a:schemeClr>
-                </a:solidFill>
-              </a:rPr>
-              <a:t> </a:t>
-            </a:r>
-            <a:r>
               <a:rPr lang="en-US" sz="2600" dirty="0" smtClean="0">
                 <a:solidFill>
                   <a:schemeClr val="tx1">
@@ -5302,107 +5265,8 @@
                   </a:schemeClr>
                 </a:solidFill>
               </a:rPr>
-              <a:t>    - </a:t>
-            </a:r>
-            <a:r>
-              <a:rPr lang="en-US" sz="2600" dirty="0" smtClean="0">
-                <a:solidFill>
-                  <a:schemeClr val="tx1">
-                    <a:lumMod val="75000"/>
-                    <a:lumOff val="25000"/>
-                  </a:schemeClr>
-                </a:solidFill>
-              </a:rPr>
-              <a:t>Gặp mặt trực tiếp khách hàng sẽ giảm thiểu các hiểu lầm.</a:t>
-            </a:r>
-            <a:endParaRPr lang="en-US" sz="2600" dirty="0" smtClean="0">
-              <a:solidFill>
-                <a:schemeClr val="tx1">
-                  <a:lumMod val="75000"/>
-                  <a:lumOff val="25000"/>
-                </a:schemeClr>
-              </a:solidFill>
-            </a:endParaRPr>
-          </a:p>
-          <a:p>
-            <a:pPr algn="l"/>
-            <a:r>
-              <a:rPr lang="en-US" sz="2600" dirty="0">
-                <a:solidFill>
-                  <a:schemeClr val="tx1">
-                    <a:lumMod val="75000"/>
-                    <a:lumOff val="25000"/>
-                  </a:schemeClr>
-                </a:solidFill>
-              </a:rPr>
-              <a:t> </a:t>
-            </a:r>
-            <a:r>
-              <a:rPr lang="en-US" sz="2600" dirty="0" smtClean="0">
-                <a:solidFill>
-                  <a:schemeClr val="tx1">
-                    <a:lumMod val="75000"/>
-                    <a:lumOff val="25000"/>
-                  </a:schemeClr>
-                </a:solidFill>
-              </a:rPr>
-              <a:t>    - </a:t>
-            </a:r>
-            <a:r>
-              <a:rPr lang="en-US" sz="2600" dirty="0" smtClean="0">
-                <a:solidFill>
-                  <a:schemeClr val="tx1">
-                    <a:lumMod val="75000"/>
-                    <a:lumOff val="25000"/>
-                  </a:schemeClr>
-                </a:solidFill>
-              </a:rPr>
-              <a:t>K</a:t>
-            </a:r>
-            <a:r>
-              <a:rPr lang="en-US" sz="2600" dirty="0" smtClean="0">
-                <a:solidFill>
-                  <a:schemeClr val="tx1">
-                    <a:lumMod val="75000"/>
-                    <a:lumOff val="25000"/>
-                  </a:schemeClr>
-                </a:solidFill>
-              </a:rPr>
-              <a:t>hách hàng quá bận: gặp hằng ngày</a:t>
-            </a:r>
-          </a:p>
-          <a:p>
-            <a:pPr algn="l"/>
-            <a:r>
-              <a:rPr lang="en-US" sz="2600" dirty="0" smtClean="0">
-                <a:solidFill>
-                  <a:schemeClr val="tx1">
-                    <a:lumMod val="75000"/>
-                    <a:lumOff val="25000"/>
-                  </a:schemeClr>
-                </a:solidFill>
-              </a:rPr>
-              <a:t> </a:t>
-            </a:r>
-            <a:r>
-              <a:rPr lang="en-US" sz="2600" dirty="0" smtClean="0">
-                <a:solidFill>
-                  <a:schemeClr val="tx1">
-                    <a:lumMod val="75000"/>
-                    <a:lumOff val="25000"/>
-                  </a:schemeClr>
-                </a:solidFill>
-              </a:rPr>
-              <a:t>    -  Khách hàng do dự, khó đưa ra quyết định: gợi ý dùm khách hàng</a:t>
-            </a:r>
-            <a:endParaRPr lang="en-US" sz="2600" dirty="0" smtClean="0">
-              <a:solidFill>
-                <a:schemeClr val="tx1">
-                  <a:lumMod val="75000"/>
-                  <a:lumOff val="25000"/>
-                </a:schemeClr>
-              </a:solidFill>
-            </a:endParaRPr>
+              <a:t>     -  Khách hàng do dự, khó đưa ra quyết định: gợi ý dùm khách hàng</a:t>
+            </a:r>
           </a:p>
         </p:txBody>
       </p:sp>
@@ -5490,7 +5354,7 @@
                   <a:schemeClr val="tx1"/>
                 </a:solidFill>
               </a:rPr>
-              <a:t>10</a:t>
+              <a:t>10. </a:t>
             </a:r>
             <a:r>
               <a:rPr lang="en-US" sz="3600" b="1" dirty="0" smtClean="0">
@@ -5498,15 +5362,7 @@
                   <a:schemeClr val="tx1"/>
                 </a:solidFill>
               </a:rPr>
-              <a:t>. </a:t>
-            </a:r>
-            <a:r>
-              <a:rPr lang="en-US" sz="3600" b="1" dirty="0" smtClean="0">
-                <a:solidFill>
-                  <a:schemeClr val="tx1"/>
-                </a:solidFill>
-              </a:rPr>
-              <a:t>Phiên bản nhỏ</a:t>
+              <a:t>Small  Releases</a:t>
             </a:r>
             <a:endParaRPr lang="en-US" sz="3600" b="1" dirty="0" smtClean="0">
               <a:solidFill>
@@ -5547,7 +5403,21 @@
                   </a:schemeClr>
                 </a:solidFill>
               </a:rPr>
-              <a:t>- </a:t>
+              <a:t>- Phát hành các phiên bản càng nhỏ càng tốt, nhưng vẫn đảm bảo tính hữu ích của chương trình.</a:t>
+            </a:r>
+          </a:p>
+          <a:p>
+            <a:pPr algn="l"/>
+            <a:r>
+              <a:rPr lang="en-US" sz="2600" dirty="0">
+                <a:solidFill>
+                  <a:schemeClr val="tx1">
+                    <a:lumMod val="75000"/>
+                    <a:lumOff val="25000"/>
+                  </a:schemeClr>
+                </a:solidFill>
+              </a:rPr>
+              <a:t> </a:t>
             </a:r>
             <a:r>
               <a:rPr lang="en-US" sz="2600" dirty="0" smtClean="0">
@@ -5558,16 +5428,8 @@
                   </a:schemeClr>
                 </a:solidFill>
               </a:rPr>
-              <a:t>Phát hành các phiên bản càng nhỏ càng tốt, nhưng vẫn đảm bảo tính hữu ích của chương trình.</a:t>
-            </a:r>
-            <a:endParaRPr lang="en-US" sz="2600" dirty="0" smtClean="0">
-              <a:solidFill>
-                <a:schemeClr val="tx1">
-                  <a:lumMod val="75000"/>
-                  <a:lumOff val="25000"/>
-                </a:schemeClr>
-              </a:solidFill>
-            </a:endParaRPr>
+              <a:t>    - Thường xuyên đón nhận phản hồi từ khách hàng.</a:t>
+            </a:r>
           </a:p>
           <a:p>
             <a:pPr algn="l"/>
@@ -5591,7 +5453,21 @@
                   </a:schemeClr>
                 </a:solidFill>
               </a:rPr>
-              <a:t>    - </a:t>
+              <a:t>    - Lên kế hoạch cho lần phát hành kế tiếp.</a:t>
+            </a:r>
+          </a:p>
+          <a:p>
+            <a:pPr algn="l"/>
+            <a:r>
+              <a:rPr lang="en-US" sz="2600" dirty="0">
+                <a:solidFill>
+                  <a:schemeClr val="tx1">
+                    <a:lumMod val="75000"/>
+                    <a:lumOff val="25000"/>
+                  </a:schemeClr>
+                </a:solidFill>
+              </a:rPr>
+              <a:t> </a:t>
             </a:r>
             <a:r>
               <a:rPr lang="en-US" sz="2600" dirty="0" smtClean="0">
@@ -5602,104 +5478,8 @@
                   </a:schemeClr>
                 </a:solidFill>
               </a:rPr>
-              <a:t>Thường xuyên đón nhận phản hồi từ khách hàng.</a:t>
-            </a:r>
-            <a:endParaRPr lang="en-US" sz="2600" dirty="0" smtClean="0">
-              <a:solidFill>
-                <a:schemeClr val="tx1">
-                  <a:lumMod val="75000"/>
-                  <a:lumOff val="25000"/>
-                </a:schemeClr>
-              </a:solidFill>
-            </a:endParaRPr>
-          </a:p>
-          <a:p>
-            <a:pPr algn="l"/>
-            <a:r>
-              <a:rPr lang="en-US" sz="2600" dirty="0">
-                <a:solidFill>
-                  <a:schemeClr val="tx1">
-                    <a:lumMod val="75000"/>
-                    <a:lumOff val="25000"/>
-                  </a:schemeClr>
-                </a:solidFill>
-              </a:rPr>
-              <a:t> </a:t>
-            </a:r>
-            <a:r>
-              <a:rPr lang="en-US" sz="2600" dirty="0" smtClean="0">
-                <a:solidFill>
-                  <a:schemeClr val="tx1">
-                    <a:lumMod val="75000"/>
-                    <a:lumOff val="25000"/>
-                  </a:schemeClr>
-                </a:solidFill>
-              </a:rPr>
-              <a:t>    - </a:t>
-            </a:r>
-            <a:r>
-              <a:rPr lang="en-US" sz="2600" dirty="0" smtClean="0">
-                <a:solidFill>
-                  <a:schemeClr val="tx1">
-                    <a:lumMod val="75000"/>
-                    <a:lumOff val="25000"/>
-                  </a:schemeClr>
-                </a:solidFill>
-              </a:rPr>
-              <a:t>Lên kế hoạch cho lần phát hành kế tiếp.</a:t>
-            </a:r>
-            <a:endParaRPr lang="en-US" sz="2600" dirty="0" smtClean="0">
-              <a:solidFill>
-                <a:schemeClr val="tx1">
-                  <a:lumMod val="75000"/>
-                  <a:lumOff val="25000"/>
-                </a:schemeClr>
-              </a:solidFill>
-            </a:endParaRPr>
-          </a:p>
-          <a:p>
-            <a:pPr algn="l"/>
-            <a:r>
-              <a:rPr lang="en-US" sz="2600" dirty="0">
-                <a:solidFill>
-                  <a:schemeClr val="tx1">
-                    <a:lumMod val="75000"/>
-                    <a:lumOff val="25000"/>
-                  </a:schemeClr>
-                </a:solidFill>
-              </a:rPr>
-              <a:t> </a:t>
-            </a:r>
-            <a:r>
-              <a:rPr lang="en-US" sz="2600" dirty="0" smtClean="0">
-                <a:solidFill>
-                  <a:schemeClr val="tx1">
-                    <a:lumMod val="75000"/>
-                    <a:lumOff val="25000"/>
-                  </a:schemeClr>
-                </a:solidFill>
-              </a:rPr>
-              <a:t>    - P</a:t>
-            </a:r>
-            <a:r>
-              <a:rPr lang="en-US" sz="2600" dirty="0" smtClean="0">
-                <a:solidFill>
-                  <a:schemeClr val="tx1">
-                    <a:lumMod val="75000"/>
-                    <a:lumOff val="25000"/>
-                  </a:schemeClr>
-                </a:solidFill>
-              </a:rPr>
-              <a:t>hát hành một phiên bản trong khoảng vài tuần.</a:t>
-            </a:r>
-            <a:endParaRPr lang="en-US" sz="2600" dirty="0" smtClean="0">
-              <a:solidFill>
-                <a:schemeClr val="tx1">
-                  <a:lumMod val="75000"/>
-                  <a:lumOff val="25000"/>
-                </a:schemeClr>
-              </a:solidFill>
-            </a:endParaRPr>
+              <a:t>    - Phát hành một phiên bản trong khoảng vài tuần.</a:t>
+            </a:r>
           </a:p>
         </p:txBody>
       </p:sp>
@@ -5787,7 +5567,7 @@
                   <a:schemeClr val="tx1"/>
                 </a:solidFill>
               </a:rPr>
-              <a:t>11</a:t>
+              <a:t>11. </a:t>
             </a:r>
             <a:r>
               <a:rPr lang="en-US" sz="3600" b="1" dirty="0" smtClean="0">
@@ -5795,36 +5575,9 @@
                   <a:schemeClr val="tx1"/>
                 </a:solidFill>
               </a:rPr>
-              <a:t>. </a:t>
-            </a:r>
-            <a:r>
-              <a:rPr lang="en-US" sz="3600" b="1" dirty="0" smtClean="0">
-                <a:solidFill>
-                  <a:schemeClr val="tx1"/>
-                </a:solidFill>
-              </a:rPr>
-              <a:t>Làm việc 40 giờ / tuần</a:t>
-            </a:r>
-          </a:p>
-          <a:p>
-            <a:pPr algn="l"/>
-            <a:r>
-              <a:rPr lang="en-US" sz="2800" dirty="0" smtClean="0">
-                <a:solidFill>
-                  <a:schemeClr val="tx1"/>
-                </a:solidFill>
-              </a:rPr>
-              <a:t> </a:t>
-            </a:r>
-            <a:r>
-              <a:rPr lang="en-US" sz="2800" dirty="0" smtClean="0">
-                <a:solidFill>
-                  <a:schemeClr val="tx1"/>
-                </a:solidFill>
-              </a:rPr>
-              <a:t>  - “fresh and eager every moring, tired and satisfied every night”</a:t>
-            </a:r>
-            <a:endParaRPr lang="en-US" sz="2800" dirty="0" smtClean="0">
+              <a:t>Forty-Hour Work Week</a:t>
+            </a:r>
+            <a:endParaRPr lang="en-US" sz="3600" b="1" dirty="0" smtClean="0">
               <a:solidFill>
                 <a:schemeClr val="tx1"/>
               </a:solidFill>
@@ -5833,6 +5586,17 @@
           <a:p>
             <a:pPr algn="l"/>
             <a:r>
+              <a:rPr lang="en-US" sz="2800" dirty="0" smtClean="0">
+                <a:solidFill>
+                  <a:schemeClr val="tx1"/>
+                </a:solidFill>
+              </a:rPr>
+              <a:t>   - “fresh and eager every moring, tired and satisfied every night”</a:t>
+            </a:r>
+          </a:p>
+          <a:p>
+            <a:pPr algn="l"/>
+            <a:r>
               <a:rPr lang="en-US" dirty="0">
                 <a:solidFill>
                   <a:schemeClr val="tx1">
@@ -5865,14 +5629,6 @@
               </a:rPr>
               <a:t>- Làm việc suốt đêm sẽ giảm hiệu suất làm việc.</a:t>
             </a:r>
-            <a:endParaRPr lang="en-US" sz="2600" dirty="0" smtClean="0">
-              <a:solidFill>
-                <a:schemeClr val="tx1">
-                  <a:lumMod val="75000"/>
-                  <a:lumOff val="25000"/>
-                </a:schemeClr>
-              </a:solidFill>
-            </a:endParaRPr>
           </a:p>
           <a:p>
             <a:pPr algn="l"/>
@@ -5896,8 +5652,11 @@
                   </a:schemeClr>
                 </a:solidFill>
               </a:rPr>
-              <a:t>    - </a:t>
-            </a:r>
+              <a:t>    - Những lập trình viên mệt mỏi sẽ rất dễ mắc phải các sai sót.  </a:t>
+            </a:r>
+          </a:p>
+          <a:p>
+            <a:pPr algn="l"/>
             <a:r>
               <a:rPr lang="en-US" sz="2600" dirty="0" smtClean="0">
                 <a:solidFill>
@@ -5907,49 +5666,8 @@
                   </a:schemeClr>
                 </a:solidFill>
               </a:rPr>
-              <a:t>Những lập trình viên mệt mỏi sẽ rất dễ mắc phải các sai sót.  </a:t>
-            </a:r>
-            <a:endParaRPr lang="en-US" sz="2600" dirty="0" smtClean="0">
-              <a:solidFill>
-                <a:schemeClr val="tx1">
-                  <a:lumMod val="75000"/>
-                  <a:lumOff val="25000"/>
-                </a:schemeClr>
-              </a:solidFill>
-            </a:endParaRPr>
-          </a:p>
-          <a:p>
-            <a:pPr algn="l"/>
-            <a:r>
-              <a:rPr lang="en-US" sz="2600" dirty="0" smtClean="0">
-                <a:solidFill>
-                  <a:schemeClr val="tx1">
-                    <a:lumMod val="75000"/>
-                    <a:lumOff val="25000"/>
-                  </a:schemeClr>
-                </a:solidFill>
-              </a:rPr>
-              <a:t> </a:t>
-            </a:r>
-            <a:r>
-              <a:rPr lang="en-US" sz="2600" dirty="0" smtClean="0">
-                <a:solidFill>
-                  <a:schemeClr val="tx1">
-                    <a:lumMod val="75000"/>
-                    <a:lumOff val="25000"/>
-                  </a:schemeClr>
-                </a:solidFill>
-              </a:rPr>
-              <a:t>    - Nếu đảo lộn sinh hoạt hằng ngày của mỗi cá nhân thì dự án sẽ lãnh hậu quả.</a:t>
-            </a:r>
-            <a:endParaRPr lang="en-US" sz="2600" dirty="0" smtClean="0">
-              <a:solidFill>
-                <a:schemeClr val="tx1">
-                  <a:lumMod val="75000"/>
-                  <a:lumOff val="25000"/>
-                </a:schemeClr>
-              </a:solidFill>
-            </a:endParaRPr>
+              <a:t>     - Nếu đảo lộn sinh hoạt hằng ngày của mỗi cá nhân thì dự án sẽ lãnh hậu quả.</a:t>
+            </a:r>
           </a:p>
         </p:txBody>
       </p:sp>
@@ -6037,7 +5755,7 @@
                   <a:schemeClr val="tx1"/>
                 </a:solidFill>
               </a:rPr>
-              <a:t>12</a:t>
+              <a:t>12. </a:t>
             </a:r>
             <a:r>
               <a:rPr lang="en-US" sz="3600" b="1" dirty="0" smtClean="0">
@@ -6045,7 +5763,7 @@
                   <a:schemeClr val="tx1"/>
                 </a:solidFill>
               </a:rPr>
-              <a:t>. Chuẩn mã nguồn</a:t>
+              <a:t>Coding  Standards</a:t>
             </a:r>
             <a:endParaRPr lang="en-US" sz="3600" b="1" dirty="0" smtClean="0">
               <a:solidFill>
@@ -6086,7 +5804,21 @@
                   </a:schemeClr>
                 </a:solidFill>
               </a:rPr>
-              <a:t>- </a:t>
+              <a:t>- Các quy ước về mã nguồn</a:t>
+            </a:r>
+          </a:p>
+          <a:p>
+            <a:pPr algn="l"/>
+            <a:r>
+              <a:rPr lang="en-US" sz="2600" dirty="0">
+                <a:solidFill>
+                  <a:schemeClr val="tx1">
+                    <a:lumMod val="75000"/>
+                    <a:lumOff val="25000"/>
+                  </a:schemeClr>
+                </a:solidFill>
+              </a:rPr>
+              <a:t> </a:t>
             </a:r>
             <a:r>
               <a:rPr lang="en-US" sz="2600" dirty="0" smtClean="0">
@@ -6097,16 +5829,8 @@
                   </a:schemeClr>
                 </a:solidFill>
               </a:rPr>
-              <a:t>Các quy ước về mã nguồn</a:t>
-            </a:r>
-            <a:endParaRPr lang="en-US" sz="2600" dirty="0" smtClean="0">
-              <a:solidFill>
-                <a:schemeClr val="tx1">
-                  <a:lumMod val="75000"/>
-                  <a:lumOff val="25000"/>
-                </a:schemeClr>
-              </a:solidFill>
-            </a:endParaRPr>
+              <a:t>    - Phương pháp comment</a:t>
+            </a:r>
           </a:p>
           <a:p>
             <a:pPr algn="l"/>
@@ -6130,8 +5854,11 @@
                   </a:schemeClr>
                 </a:solidFill>
               </a:rPr>
-              <a:t>    - </a:t>
-            </a:r>
+              <a:t>    - Chuẩn mã nguồn phải đơn giản và nghiêm ngặt.</a:t>
+            </a:r>
+          </a:p>
+          <a:p>
+            <a:pPr algn="l"/>
             <a:r>
               <a:rPr lang="en-US" sz="2600" dirty="0" smtClean="0">
                 <a:solidFill>
@@ -6141,107 +5868,8 @@
                   </a:schemeClr>
                 </a:solidFill>
               </a:rPr>
-              <a:t>Phương pháp comment</a:t>
-            </a:r>
-            <a:endParaRPr lang="en-US" sz="2600" dirty="0" smtClean="0">
-              <a:solidFill>
-                <a:schemeClr val="tx1">
-                  <a:lumMod val="75000"/>
-                  <a:lumOff val="25000"/>
-                </a:schemeClr>
-              </a:solidFill>
-            </a:endParaRPr>
-          </a:p>
-          <a:p>
-            <a:pPr algn="l"/>
-            <a:r>
-              <a:rPr lang="en-US" sz="2600" dirty="0">
-                <a:solidFill>
-                  <a:schemeClr val="tx1">
-                    <a:lumMod val="75000"/>
-                    <a:lumOff val="25000"/>
-                  </a:schemeClr>
-                </a:solidFill>
-              </a:rPr>
-              <a:t> </a:t>
-            </a:r>
-            <a:r>
-              <a:rPr lang="en-US" sz="2600" dirty="0" smtClean="0">
-                <a:solidFill>
-                  <a:schemeClr val="tx1">
-                    <a:lumMod val="75000"/>
-                    <a:lumOff val="25000"/>
-                  </a:schemeClr>
-                </a:solidFill>
-              </a:rPr>
-              <a:t>    - </a:t>
-            </a:r>
-            <a:r>
-              <a:rPr lang="en-US" sz="2600" dirty="0" smtClean="0">
-                <a:solidFill>
-                  <a:schemeClr val="tx1">
-                    <a:lumMod val="75000"/>
-                    <a:lumOff val="25000"/>
-                  </a:schemeClr>
-                </a:solidFill>
-              </a:rPr>
-              <a:t>Chuẩn mã nguồn phải đơn giản và nghiêm ngặt.</a:t>
-            </a:r>
-          </a:p>
-          <a:p>
-            <a:pPr algn="l"/>
-            <a:r>
-              <a:rPr lang="en-US" sz="2600" dirty="0" smtClean="0">
-                <a:solidFill>
-                  <a:schemeClr val="tx1">
-                    <a:lumMod val="75000"/>
-                    <a:lumOff val="25000"/>
-                  </a:schemeClr>
-                </a:solidFill>
-              </a:rPr>
-              <a:t> </a:t>
-            </a:r>
-            <a:r>
-              <a:rPr lang="en-US" sz="2600" dirty="0" smtClean="0">
-                <a:solidFill>
-                  <a:schemeClr val="tx1">
-                    <a:lumMod val="75000"/>
-                    <a:lumOff val="25000"/>
-                  </a:schemeClr>
-                </a:solidFill>
-              </a:rPr>
-              <a:t>    - Có thể sử dụng </a:t>
-            </a:r>
-            <a:r>
-              <a:rPr lang="en-US" sz="2600" dirty="0" smtClean="0">
-                <a:solidFill>
-                  <a:schemeClr val="tx1">
-                    <a:lumMod val="75000"/>
-                    <a:lumOff val="25000"/>
-                  </a:schemeClr>
-                </a:solidFill>
-              </a:rPr>
-              <a:t>các công cụ kiểm tra mã </a:t>
-            </a:r>
-            <a:r>
-              <a:rPr lang="en-US" sz="2600" dirty="0" smtClean="0">
-                <a:solidFill>
-                  <a:schemeClr val="tx1">
-                    <a:lumMod val="75000"/>
-                    <a:lumOff val="25000"/>
-                  </a:schemeClr>
-                </a:solidFill>
-              </a:rPr>
-              <a:t>nguồn (FxCop, CheckStyle,…).</a:t>
-            </a:r>
-            <a:endParaRPr lang="en-US" sz="2600" dirty="0" smtClean="0">
-              <a:solidFill>
-                <a:schemeClr val="tx1">
-                  <a:lumMod val="75000"/>
-                  <a:lumOff val="25000"/>
-                </a:schemeClr>
-              </a:solidFill>
-            </a:endParaRPr>
+              <a:t>     - Có thể sử dụng các công cụ kiểm tra mã nguồn (FxCop, CheckStyle,…).</a:t>
+            </a:r>
           </a:p>
         </p:txBody>
       </p:sp>

</xml_diff>